<commit_message>
profa Leticia, videos e apresentações
</commit_message>
<xml_diff>
--- a/libs/uds/flyer.pptx
+++ b/libs/uds/flyer.pptx
@@ -5,7 +5,7 @@
     <p:sldMasterId id="2147483648" r:id="rId1"/>
   </p:sldMasterIdLst>
   <p:notesMasterIdLst>
-    <p:notesMasterId r:id="rId10"/>
+    <p:notesMasterId r:id="rId11"/>
   </p:notesMasterIdLst>
   <p:sldIdLst>
     <p:sldId id="256" r:id="rId2"/>
@@ -16,6 +16,7 @@
     <p:sldId id="260" r:id="rId7"/>
     <p:sldId id="261" r:id="rId8"/>
     <p:sldId id="263" r:id="rId9"/>
+    <p:sldId id="264" r:id="rId10"/>
   </p:sldIdLst>
   <p:sldSz cx="9144000" cy="6858000" type="screen4x3"/>
   <p:notesSz cx="6858000" cy="9144000"/>
@@ -200,7 +201,7 @@
             <a:fld id="{03CA6A64-D8DA-4790-AC21-8D1D39F048E7}" type="datetimeFigureOut">
               <a:rPr lang="pt-BR" smtClean="0"/>
               <a:pPr/>
-              <a:t>12/06/2020</a:t>
+              <a:t>15/06/2020</a:t>
             </a:fld>
             <a:endParaRPr lang="pt-BR"/>
           </a:p>
@@ -894,7 +895,7 @@
             <a:fld id="{32EE085F-AAA4-4482-A02A-EDCE077316B0}" type="datetimeFigureOut">
               <a:rPr lang="pt-BR" smtClean="0"/>
               <a:pPr/>
-              <a:t>12/06/2020</a:t>
+              <a:t>15/06/2020</a:t>
             </a:fld>
             <a:endParaRPr lang="pt-BR"/>
           </a:p>
@@ -1061,7 +1062,7 @@
             <a:fld id="{32EE085F-AAA4-4482-A02A-EDCE077316B0}" type="datetimeFigureOut">
               <a:rPr lang="pt-BR" smtClean="0"/>
               <a:pPr/>
-              <a:t>12/06/2020</a:t>
+              <a:t>15/06/2020</a:t>
             </a:fld>
             <a:endParaRPr lang="pt-BR"/>
           </a:p>
@@ -1238,7 +1239,7 @@
             <a:fld id="{32EE085F-AAA4-4482-A02A-EDCE077316B0}" type="datetimeFigureOut">
               <a:rPr lang="pt-BR" smtClean="0"/>
               <a:pPr/>
-              <a:t>12/06/2020</a:t>
+              <a:t>15/06/2020</a:t>
             </a:fld>
             <a:endParaRPr lang="pt-BR"/>
           </a:p>
@@ -1405,7 +1406,7 @@
             <a:fld id="{32EE085F-AAA4-4482-A02A-EDCE077316B0}" type="datetimeFigureOut">
               <a:rPr lang="pt-BR" smtClean="0"/>
               <a:pPr/>
-              <a:t>12/06/2020</a:t>
+              <a:t>15/06/2020</a:t>
             </a:fld>
             <a:endParaRPr lang="pt-BR"/>
           </a:p>
@@ -1648,7 +1649,7 @@
             <a:fld id="{32EE085F-AAA4-4482-A02A-EDCE077316B0}" type="datetimeFigureOut">
               <a:rPr lang="pt-BR" smtClean="0"/>
               <a:pPr/>
-              <a:t>12/06/2020</a:t>
+              <a:t>15/06/2020</a:t>
             </a:fld>
             <a:endParaRPr lang="pt-BR"/>
           </a:p>
@@ -1933,7 +1934,7 @@
             <a:fld id="{32EE085F-AAA4-4482-A02A-EDCE077316B0}" type="datetimeFigureOut">
               <a:rPr lang="pt-BR" smtClean="0"/>
               <a:pPr/>
-              <a:t>12/06/2020</a:t>
+              <a:t>15/06/2020</a:t>
             </a:fld>
             <a:endParaRPr lang="pt-BR"/>
           </a:p>
@@ -2352,7 +2353,7 @@
             <a:fld id="{32EE085F-AAA4-4482-A02A-EDCE077316B0}" type="datetimeFigureOut">
               <a:rPr lang="pt-BR" smtClean="0"/>
               <a:pPr/>
-              <a:t>12/06/2020</a:t>
+              <a:t>15/06/2020</a:t>
             </a:fld>
             <a:endParaRPr lang="pt-BR"/>
           </a:p>
@@ -2467,7 +2468,7 @@
             <a:fld id="{32EE085F-AAA4-4482-A02A-EDCE077316B0}" type="datetimeFigureOut">
               <a:rPr lang="pt-BR" smtClean="0"/>
               <a:pPr/>
-              <a:t>12/06/2020</a:t>
+              <a:t>15/06/2020</a:t>
             </a:fld>
             <a:endParaRPr lang="pt-BR"/>
           </a:p>
@@ -2559,7 +2560,7 @@
             <a:fld id="{32EE085F-AAA4-4482-A02A-EDCE077316B0}" type="datetimeFigureOut">
               <a:rPr lang="pt-BR" smtClean="0"/>
               <a:pPr/>
-              <a:t>12/06/2020</a:t>
+              <a:t>15/06/2020</a:t>
             </a:fld>
             <a:endParaRPr lang="pt-BR"/>
           </a:p>
@@ -2833,7 +2834,7 @@
             <a:fld id="{32EE085F-AAA4-4482-A02A-EDCE077316B0}" type="datetimeFigureOut">
               <a:rPr lang="pt-BR" smtClean="0"/>
               <a:pPr/>
-              <a:t>12/06/2020</a:t>
+              <a:t>15/06/2020</a:t>
             </a:fld>
             <a:endParaRPr lang="pt-BR"/>
           </a:p>
@@ -3083,7 +3084,7 @@
             <a:fld id="{32EE085F-AAA4-4482-A02A-EDCE077316B0}" type="datetimeFigureOut">
               <a:rPr lang="pt-BR" smtClean="0"/>
               <a:pPr/>
-              <a:t>12/06/2020</a:t>
+              <a:t>15/06/2020</a:t>
             </a:fld>
             <a:endParaRPr lang="pt-BR"/>
           </a:p>
@@ -3293,7 +3294,7 @@
             <a:fld id="{32EE085F-AAA4-4482-A02A-EDCE077316B0}" type="datetimeFigureOut">
               <a:rPr lang="pt-BR" smtClean="0"/>
               <a:pPr/>
-              <a:t>12/06/2020</a:t>
+              <a:t>15/06/2020</a:t>
             </a:fld>
             <a:endParaRPr lang="pt-BR"/>
           </a:p>
@@ -7104,16 +7105,7 @@
                   </a:solidFill>
                   <a:latin typeface="Ink Free" pitchFamily="66" charset="0"/>
                 </a:rPr>
-                <a:t>15/06   </a:t>
-              </a:r>
-              <a:r>
-                <a:rPr lang="pt-BR" sz="4400" b="1" dirty="0" smtClean="0">
-                  <a:solidFill>
-                    <a:schemeClr val="tx1"/>
-                  </a:solidFill>
-                  <a:latin typeface="Ink Free" pitchFamily="66" charset="0"/>
-                </a:rPr>
-                <a:t>14 horas</a:t>
+                <a:t>15/06   14 horas</a:t>
               </a:r>
               <a:endParaRPr lang="pt-BR" sz="4400" b="1" dirty="0">
                 <a:solidFill>
@@ -7156,9 +7148,6 @@
                 </a:rPr>
                 <a:t>O Pandemônio da Pandemia</a:t>
               </a:r>
-              <a:endParaRPr lang="pt-BR" sz="2400" b="1" dirty="0" smtClean="0">
-                <a:latin typeface="Ink Free" pitchFamily="66" charset="0"/>
-              </a:endParaRPr>
             </a:p>
           </p:txBody>
         </p:sp>
@@ -7198,13 +7187,7 @@
                 <a:rPr lang="pt-BR" sz="2000" b="1" dirty="0" smtClean="0">
                   <a:latin typeface="Ink Free" pitchFamily="66" charset="0"/>
                 </a:rPr>
-                <a:t>. </a:t>
-              </a:r>
-              <a:r>
-                <a:rPr lang="pt-BR" sz="2000" b="1" dirty="0" smtClean="0">
-                  <a:latin typeface="Ink Free" pitchFamily="66" charset="0"/>
-                </a:rPr>
-                <a:t>Luciane </a:t>
+                <a:t>. Luciane </a:t>
               </a:r>
               <a:r>
                 <a:rPr lang="pt-BR" sz="2000" b="1" dirty="0" err="1" smtClean="0">
@@ -7273,23 +7256,8 @@
                   </a:solidFill>
                   <a:latin typeface="Ink Free" pitchFamily="66" charset="0"/>
                 </a:rPr>
-                <a:t>mediação:  </a:t>
-              </a:r>
-              <a:r>
-                <a:rPr lang="pt-BR" sz="2000" b="1" dirty="0" smtClean="0">
-                  <a:solidFill>
-                    <a:schemeClr val="tx1"/>
-                  </a:solidFill>
-                  <a:latin typeface="Ink Free" pitchFamily="66" charset="0"/>
-                </a:rPr>
-                <a:t>Prof. Davi Alves</a:t>
-              </a:r>
-              <a:endParaRPr lang="pt-BR" sz="2000" b="1" dirty="0" smtClean="0">
-                <a:solidFill>
-                  <a:schemeClr val="tx1"/>
-                </a:solidFill>
-                <a:latin typeface="Ink Free" pitchFamily="66" charset="0"/>
-              </a:endParaRPr>
+                <a:t>mediação:  Prof. Davi Alves</a:t>
+              </a:r>
             </a:p>
           </p:txBody>
         </p:sp>
@@ -7451,6 +7419,607 @@
                   <a:latin typeface="Ink Free" pitchFamily="66" charset="0"/>
                 </a:rPr>
                 <a:t>Talks</a:t>
+              </a:r>
+              <a:endParaRPr lang="pt-BR" sz="2800" b="1" dirty="0" smtClean="0">
+                <a:solidFill>
+                  <a:schemeClr val="tx1"/>
+                </a:solidFill>
+                <a:latin typeface="Ink Free" pitchFamily="66" charset="0"/>
+              </a:endParaRPr>
+            </a:p>
+          </p:txBody>
+        </p:sp>
+      </p:grpSp>
+    </p:spTree>
+  </p:cSld>
+  <p:clrMapOvr>
+    <a:masterClrMapping/>
+  </p:clrMapOvr>
+  <p:timing>
+    <p:tnLst>
+      <p:par>
+        <p:cTn id="1" dur="indefinite" restart="never" nodeType="tmRoot"/>
+      </p:par>
+    </p:tnLst>
+  </p:timing>
+</p:sld>
+</file>
+
+<file path=ppt/slides/slide9.xml><?xml version="1.0" encoding="utf-8"?>
+<p:sld xmlns:a="http://schemas.openxmlformats.org/drawingml/2006/main" xmlns:r="http://schemas.openxmlformats.org/officeDocument/2006/relationships" xmlns:p="http://schemas.openxmlformats.org/presentationml/2006/main">
+  <p:cSld>
+    <p:spTree>
+      <p:nvGrpSpPr>
+        <p:cNvPr id="1" name=""/>
+        <p:cNvGrpSpPr/>
+        <p:nvPr/>
+      </p:nvGrpSpPr>
+      <p:grpSpPr>
+        <a:xfrm>
+          <a:off x="0" y="0"/>
+          <a:ext cx="0" cy="0"/>
+          <a:chOff x="0" y="0"/>
+          <a:chExt cx="0" cy="0"/>
+        </a:xfrm>
+      </p:grpSpPr>
+      <p:grpSp>
+        <p:nvGrpSpPr>
+          <p:cNvPr id="9" name="Grupo 12"/>
+          <p:cNvGrpSpPr/>
+          <p:nvPr/>
+        </p:nvGrpSpPr>
+        <p:grpSpPr>
+          <a:xfrm>
+            <a:off x="-612576" y="-27384"/>
+            <a:ext cx="10513168" cy="6858000"/>
+            <a:chOff x="-612576" y="27384"/>
+            <a:chExt cx="10513168" cy="6858000"/>
+          </a:xfrm>
+        </p:grpSpPr>
+        <p:pic>
+          <p:nvPicPr>
+            <p:cNvPr id="11" name="Imagem 10" descr="Rpy.png"/>
+            <p:cNvPicPr>
+              <a:picLocks noChangeAspect="1"/>
+            </p:cNvPicPr>
+            <p:nvPr/>
+          </p:nvPicPr>
+          <p:blipFill>
+            <a:blip r:embed="rId2" cstate="print"/>
+            <a:srcRect l="375" t="32022" r="92044" b="62554"/>
+            <a:stretch>
+              <a:fillRect/>
+            </a:stretch>
+          </p:blipFill>
+          <p:spPr>
+            <a:xfrm>
+              <a:off x="0" y="27384"/>
+              <a:ext cx="9468544" cy="6858000"/>
+            </a:xfrm>
+            <a:prstGeom prst="rect">
+              <a:avLst/>
+            </a:prstGeom>
+          </p:spPr>
+        </p:pic>
+        <p:pic>
+          <p:nvPicPr>
+            <p:cNvPr id="15" name="Picture 4" descr="https://pbs.twimg.com/media/DfqjHpNU0AIuufg.jpg"/>
+            <p:cNvPicPr>
+              <a:picLocks noChangeAspect="1" noChangeArrowheads="1"/>
+            </p:cNvPicPr>
+            <p:nvPr/>
+          </p:nvPicPr>
+          <p:blipFill>
+            <a:blip r:embed="rId3" cstate="print">
+              <a:duotone>
+                <a:prstClr val="black"/>
+                <a:srgbClr val="FFFF00">
+                  <a:tint val="45000"/>
+                  <a:satMod val="400000"/>
+                </a:srgbClr>
+              </a:duotone>
+            </a:blip>
+            <a:srcRect b="9841"/>
+            <a:stretch>
+              <a:fillRect/>
+            </a:stretch>
+          </p:blipFill>
+          <p:spPr bwMode="auto">
+            <a:xfrm>
+              <a:off x="-612576" y="27384"/>
+              <a:ext cx="10513168" cy="6858000"/>
+            </a:xfrm>
+            <a:prstGeom prst="rect">
+              <a:avLst/>
+            </a:prstGeom>
+            <a:noFill/>
+          </p:spPr>
+        </p:pic>
+        <p:pic>
+          <p:nvPicPr>
+            <p:cNvPr id="2" name="Imagem 1" descr="corpus-banner.png"/>
+            <p:cNvPicPr>
+              <a:picLocks noChangeAspect="1"/>
+            </p:cNvPicPr>
+            <p:nvPr/>
+          </p:nvPicPr>
+          <p:blipFill>
+            <a:blip r:embed="rId4" cstate="print"/>
+            <a:stretch>
+              <a:fillRect/>
+            </a:stretch>
+          </p:blipFill>
+          <p:spPr>
+            <a:xfrm>
+              <a:off x="-36512" y="1434877"/>
+              <a:ext cx="3672408" cy="4253755"/>
+            </a:xfrm>
+            <a:prstGeom prst="rect">
+              <a:avLst/>
+            </a:prstGeom>
+          </p:spPr>
+        </p:pic>
+        <p:sp>
+          <p:nvSpPr>
+            <p:cNvPr id="3" name="Retângulo 2"/>
+            <p:cNvSpPr/>
+            <p:nvPr/>
+          </p:nvSpPr>
+          <p:spPr>
+            <a:xfrm>
+              <a:off x="4058346" y="116632"/>
+              <a:ext cx="5410198" cy="846856"/>
+            </a:xfrm>
+            <a:prstGeom prst="rect">
+              <a:avLst/>
+            </a:prstGeom>
+            <a:solidFill>
+              <a:schemeClr val="bg1"/>
+            </a:solidFill>
+            <a:ln>
+              <a:noFill/>
+            </a:ln>
+          </p:spPr>
+          <p:style>
+            <a:lnRef idx="2">
+              <a:schemeClr val="accent1">
+                <a:shade val="50000"/>
+              </a:schemeClr>
+            </a:lnRef>
+            <a:fillRef idx="1">
+              <a:schemeClr val="accent1"/>
+            </a:fillRef>
+            <a:effectRef idx="0">
+              <a:schemeClr val="accent1"/>
+            </a:effectRef>
+            <a:fontRef idx="minor">
+              <a:schemeClr val="lt1"/>
+            </a:fontRef>
+          </p:style>
+          <p:txBody>
+            <a:bodyPr rtlCol="0" anchor="ctr"/>
+            <a:lstStyle/>
+            <a:p>
+              <a:pPr algn="ctr"/>
+              <a:endParaRPr lang="pt-BR" b="1" dirty="0">
+                <a:solidFill>
+                  <a:schemeClr val="tx1"/>
+                </a:solidFill>
+              </a:endParaRPr>
+            </a:p>
+          </p:txBody>
+        </p:sp>
+        <p:sp>
+          <p:nvSpPr>
+            <p:cNvPr id="4" name="Retângulo 3"/>
+            <p:cNvSpPr/>
+            <p:nvPr/>
+          </p:nvSpPr>
+          <p:spPr>
+            <a:xfrm>
+              <a:off x="4070378" y="4460750"/>
+              <a:ext cx="5398166" cy="679202"/>
+            </a:xfrm>
+            <a:prstGeom prst="rect">
+              <a:avLst/>
+            </a:prstGeom>
+            <a:solidFill>
+              <a:schemeClr val="bg1"/>
+            </a:solidFill>
+            <a:ln>
+              <a:noFill/>
+            </a:ln>
+          </p:spPr>
+          <p:style>
+            <a:lnRef idx="2">
+              <a:schemeClr val="accent1">
+                <a:shade val="50000"/>
+              </a:schemeClr>
+            </a:lnRef>
+            <a:fillRef idx="1">
+              <a:schemeClr val="accent1"/>
+            </a:fillRef>
+            <a:effectRef idx="0">
+              <a:schemeClr val="accent1"/>
+            </a:effectRef>
+            <a:fontRef idx="minor">
+              <a:schemeClr val="lt1"/>
+            </a:fontRef>
+          </p:style>
+          <p:txBody>
+            <a:bodyPr rtlCol="0" anchor="ctr"/>
+            <a:lstStyle/>
+            <a:p>
+              <a:pPr algn="ctr"/>
+              <a:r>
+                <a:rPr lang="pt-BR" sz="3200" b="1" dirty="0" smtClean="0">
+                  <a:solidFill>
+                    <a:schemeClr val="tx1"/>
+                  </a:solidFill>
+                  <a:latin typeface="Ink Free" pitchFamily="66" charset="0"/>
+                </a:rPr>
+                <a:t>22/06   </a:t>
+              </a:r>
+              <a:r>
+                <a:rPr lang="pt-BR" sz="3200" b="1" dirty="0" smtClean="0">
+                  <a:solidFill>
+                    <a:schemeClr val="tx1"/>
+                  </a:solidFill>
+                  <a:latin typeface="Ink Free" pitchFamily="66" charset="0"/>
+                </a:rPr>
+                <a:t>14 horas</a:t>
+              </a:r>
+              <a:endParaRPr lang="pt-BR" sz="3200" b="1" dirty="0">
+                <a:solidFill>
+                  <a:schemeClr val="tx1"/>
+                </a:solidFill>
+                <a:latin typeface="Ink Free" pitchFamily="66" charset="0"/>
+              </a:endParaRPr>
+            </a:p>
+          </p:txBody>
+        </p:sp>
+        <p:sp>
+          <p:nvSpPr>
+            <p:cNvPr id="5" name="CaixaDeTexto 4"/>
+            <p:cNvSpPr txBox="1"/>
+            <p:nvPr/>
+          </p:nvSpPr>
+          <p:spPr>
+            <a:xfrm>
+              <a:off x="4139952" y="87015"/>
+              <a:ext cx="5076056" cy="1200329"/>
+            </a:xfrm>
+            <a:prstGeom prst="rect">
+              <a:avLst/>
+            </a:prstGeom>
+            <a:noFill/>
+            <a:ln>
+              <a:noFill/>
+            </a:ln>
+          </p:spPr>
+          <p:txBody>
+            <a:bodyPr wrap="square" rtlCol="0">
+              <a:spAutoFit/>
+            </a:bodyPr>
+            <a:lstStyle/>
+            <a:p>
+              <a:r>
+                <a:rPr lang="pt-BR" sz="2400" b="1" dirty="0" smtClean="0">
+                  <a:latin typeface="Ink Free" pitchFamily="66" charset="0"/>
+                </a:rPr>
+                <a:t>Atividades </a:t>
+              </a:r>
+              <a:r>
+                <a:rPr lang="pt-BR" sz="2400" b="1" dirty="0" smtClean="0">
+                  <a:latin typeface="Ink Free" pitchFamily="66" charset="0"/>
+                </a:rPr>
+                <a:t>e Ferramentas para o Ensino </a:t>
+              </a:r>
+              <a:r>
+                <a:rPr lang="pt-BR" sz="2400" b="1" dirty="0" smtClean="0">
+                  <a:latin typeface="Ink Free" pitchFamily="66" charset="0"/>
+                </a:rPr>
+                <a:t>Online</a:t>
+              </a:r>
+            </a:p>
+            <a:p>
+              <a:endParaRPr lang="pt-BR" sz="2400" b="1" dirty="0" smtClean="0">
+                <a:latin typeface="Ink Free" pitchFamily="66" charset="0"/>
+              </a:endParaRPr>
+            </a:p>
+          </p:txBody>
+        </p:sp>
+        <p:sp>
+          <p:nvSpPr>
+            <p:cNvPr id="6" name="CaixaDeTexto 5"/>
+            <p:cNvSpPr txBox="1"/>
+            <p:nvPr/>
+          </p:nvSpPr>
+          <p:spPr>
+            <a:xfrm>
+              <a:off x="5076056" y="635386"/>
+              <a:ext cx="4376576" cy="400110"/>
+            </a:xfrm>
+            <a:prstGeom prst="rect">
+              <a:avLst/>
+            </a:prstGeom>
+            <a:noFill/>
+            <a:ln>
+              <a:noFill/>
+            </a:ln>
+          </p:spPr>
+          <p:txBody>
+            <a:bodyPr wrap="square" rtlCol="0">
+              <a:spAutoFit/>
+            </a:bodyPr>
+            <a:lstStyle/>
+            <a:p>
+              <a:pPr algn="r"/>
+              <a:r>
+                <a:rPr lang="pt-BR" sz="2000" b="1" dirty="0" err="1" smtClean="0">
+                  <a:latin typeface="Ink Free" pitchFamily="66" charset="0"/>
+                </a:rPr>
+                <a:t>Profa</a:t>
+              </a:r>
+              <a:r>
+                <a:rPr lang="pt-BR" sz="2000" b="1" dirty="0" smtClean="0">
+                  <a:latin typeface="Ink Free" pitchFamily="66" charset="0"/>
+                </a:rPr>
+                <a:t>. Letícia </a:t>
+              </a:r>
+              <a:r>
+                <a:rPr lang="pt-BR" sz="2000" b="1" dirty="0" smtClean="0">
+                  <a:latin typeface="Ink Free" pitchFamily="66" charset="0"/>
+                </a:rPr>
+                <a:t>Raposo</a:t>
+              </a:r>
+              <a:endParaRPr lang="pt-BR" b="1" dirty="0">
+                <a:latin typeface="Ink Free" pitchFamily="66" charset="0"/>
+              </a:endParaRPr>
+            </a:p>
+          </p:txBody>
+        </p:sp>
+        <p:sp>
+          <p:nvSpPr>
+            <p:cNvPr id="7" name="Retângulo 6"/>
+            <p:cNvSpPr/>
+            <p:nvPr/>
+          </p:nvSpPr>
+          <p:spPr>
+            <a:xfrm>
+              <a:off x="4064008" y="5251672"/>
+              <a:ext cx="5404536" cy="464344"/>
+            </a:xfrm>
+            <a:prstGeom prst="rect">
+              <a:avLst/>
+            </a:prstGeom>
+            <a:solidFill>
+              <a:schemeClr val="bg1"/>
+            </a:solidFill>
+            <a:ln>
+              <a:noFill/>
+            </a:ln>
+          </p:spPr>
+          <p:style>
+            <a:lnRef idx="2">
+              <a:schemeClr val="accent1">
+                <a:shade val="50000"/>
+              </a:schemeClr>
+            </a:lnRef>
+            <a:fillRef idx="1">
+              <a:schemeClr val="accent1"/>
+            </a:fillRef>
+            <a:effectRef idx="0">
+              <a:schemeClr val="accent1"/>
+            </a:effectRef>
+            <a:fontRef idx="minor">
+              <a:schemeClr val="lt1"/>
+            </a:fontRef>
+          </p:style>
+          <p:txBody>
+            <a:bodyPr rtlCol="0" anchor="ctr"/>
+            <a:lstStyle/>
+            <a:p>
+              <a:pPr algn="ctr"/>
+              <a:r>
+                <a:rPr lang="pt-BR" sz="2000" b="1" dirty="0" smtClean="0">
+                  <a:solidFill>
+                    <a:schemeClr val="tx1"/>
+                  </a:solidFill>
+                  <a:latin typeface="Ink Free" pitchFamily="66" charset="0"/>
+                </a:rPr>
+                <a:t>mediação:  Prof. </a:t>
+              </a:r>
+              <a:r>
+                <a:rPr lang="pt-BR" sz="2000" b="1" dirty="0" smtClean="0">
+                  <a:solidFill>
+                    <a:schemeClr val="tx1"/>
+                  </a:solidFill>
+                  <a:latin typeface="Ink Free" pitchFamily="66" charset="0"/>
+                </a:rPr>
+                <a:t> </a:t>
+              </a:r>
+              <a:r>
+                <a:rPr lang="pt-BR" sz="2000" b="1" dirty="0" smtClean="0">
+                  <a:solidFill>
+                    <a:schemeClr val="tx1"/>
+                  </a:solidFill>
+                  <a:latin typeface="Ink Free" pitchFamily="66" charset="0"/>
+                </a:rPr>
+                <a:t>Bruno </a:t>
+              </a:r>
+              <a:r>
+                <a:rPr lang="pt-BR" sz="2000" b="1" dirty="0" smtClean="0">
+                  <a:solidFill>
+                    <a:schemeClr val="tx1"/>
+                  </a:solidFill>
+                  <a:latin typeface="Ink Free" pitchFamily="66" charset="0"/>
+                </a:rPr>
+                <a:t>Simões</a:t>
+              </a:r>
+              <a:endParaRPr lang="pt-BR" sz="2000" b="1" dirty="0" smtClean="0">
+                <a:solidFill>
+                  <a:schemeClr val="tx1"/>
+                </a:solidFill>
+                <a:latin typeface="Ink Free" pitchFamily="66" charset="0"/>
+              </a:endParaRPr>
+            </a:p>
+          </p:txBody>
+        </p:sp>
+        <p:sp>
+          <p:nvSpPr>
+            <p:cNvPr id="8" name="Retângulo 7"/>
+            <p:cNvSpPr/>
+            <p:nvPr/>
+          </p:nvSpPr>
+          <p:spPr>
+            <a:xfrm>
+              <a:off x="4062817" y="5830359"/>
+              <a:ext cx="5405727" cy="821761"/>
+            </a:xfrm>
+            <a:prstGeom prst="rect">
+              <a:avLst/>
+            </a:prstGeom>
+            <a:solidFill>
+              <a:schemeClr val="bg1"/>
+            </a:solidFill>
+            <a:ln>
+              <a:noFill/>
+            </a:ln>
+          </p:spPr>
+          <p:style>
+            <a:lnRef idx="2">
+              <a:schemeClr val="accent1">
+                <a:shade val="50000"/>
+              </a:schemeClr>
+            </a:lnRef>
+            <a:fillRef idx="1">
+              <a:schemeClr val="accent1"/>
+            </a:fillRef>
+            <a:effectRef idx="0">
+              <a:schemeClr val="accent1"/>
+            </a:effectRef>
+            <a:fontRef idx="minor">
+              <a:schemeClr val="lt1"/>
+            </a:fontRef>
+          </p:style>
+          <p:txBody>
+            <a:bodyPr rtlCol="0" anchor="ctr"/>
+            <a:lstStyle/>
+            <a:p>
+              <a:pPr algn="ctr"/>
+              <a:r>
+                <a:rPr lang="pt-BR" sz="2400" dirty="0" smtClean="0">
+                  <a:solidFill>
+                    <a:schemeClr val="tx1"/>
+                  </a:solidFill>
+                  <a:latin typeface="Forte" pitchFamily="66" charset="0"/>
+                </a:rPr>
+                <a:t>Link </a:t>
+              </a:r>
+              <a:r>
+                <a:rPr lang="pt-BR" sz="2400" dirty="0">
+                  <a:solidFill>
+                    <a:schemeClr val="tx1"/>
+                  </a:solidFill>
+                  <a:latin typeface="Forte" pitchFamily="66" charset="0"/>
+                </a:rPr>
+                <a:t>para o </a:t>
+              </a:r>
+              <a:r>
+                <a:rPr lang="pt-BR" sz="2400" dirty="0" smtClean="0">
+                  <a:solidFill>
+                    <a:schemeClr val="tx1"/>
+                  </a:solidFill>
+                  <a:latin typeface="Forte" pitchFamily="66" charset="0"/>
+                </a:rPr>
+                <a:t>evento</a:t>
+              </a:r>
+            </a:p>
+            <a:p>
+              <a:pPr algn="ctr"/>
+              <a:r>
+                <a:rPr lang="pt-BR" sz="2400" b="1" dirty="0" err="1" smtClean="0">
+                  <a:solidFill>
+                    <a:srgbClr val="002060"/>
+                  </a:solidFill>
+                </a:rPr>
+                <a:t>meet</a:t>
+              </a:r>
+              <a:r>
+                <a:rPr lang="pt-BR" sz="2400" b="1" dirty="0" smtClean="0">
+                  <a:solidFill>
+                    <a:srgbClr val="002060"/>
+                  </a:solidFill>
+                </a:rPr>
+                <a:t>.google.com/</a:t>
+              </a:r>
+              <a:r>
+                <a:rPr lang="pt-BR" sz="2400" b="1" dirty="0" err="1" smtClean="0">
+                  <a:solidFill>
+                    <a:srgbClr val="002060"/>
+                  </a:solidFill>
+                </a:rPr>
+                <a:t>cfo-zhba-oyr</a:t>
+              </a:r>
+              <a:endParaRPr lang="pt-BR" sz="2400" b="1" dirty="0" smtClean="0">
+                <a:solidFill>
+                  <a:srgbClr val="002060"/>
+                </a:solidFill>
+              </a:endParaRPr>
+            </a:p>
+          </p:txBody>
+        </p:sp>
+        <p:sp>
+          <p:nvSpPr>
+            <p:cNvPr id="12" name="Retângulo 11"/>
+            <p:cNvSpPr/>
+            <p:nvPr/>
+          </p:nvSpPr>
+          <p:spPr>
+            <a:xfrm>
+              <a:off x="4067944" y="1052736"/>
+              <a:ext cx="5400600" cy="3312368"/>
+            </a:xfrm>
+            <a:prstGeom prst="rect">
+              <a:avLst/>
+            </a:prstGeom>
+            <a:solidFill>
+              <a:schemeClr val="bg1"/>
+            </a:solidFill>
+            <a:ln>
+              <a:noFill/>
+            </a:ln>
+          </p:spPr>
+          <p:style>
+            <a:lnRef idx="2">
+              <a:schemeClr val="accent1">
+                <a:shade val="50000"/>
+              </a:schemeClr>
+            </a:lnRef>
+            <a:fillRef idx="1">
+              <a:schemeClr val="accent1"/>
+            </a:fillRef>
+            <a:effectRef idx="0">
+              <a:schemeClr val="accent1"/>
+            </a:effectRef>
+            <a:fontRef idx="minor">
+              <a:schemeClr val="lt1"/>
+            </a:fontRef>
+          </p:style>
+          <p:txBody>
+            <a:bodyPr rtlCol="0" anchor="ctr"/>
+            <a:lstStyle/>
+            <a:p>
+              <a:pPr algn="just"/>
+              <a:r>
+                <a:rPr lang="pt-BR" sz="1600" b="1" dirty="0" smtClean="0">
+                  <a:solidFill>
+                    <a:schemeClr val="tx1"/>
+                  </a:solidFill>
+                  <a:latin typeface="Ink Free" pitchFamily="66" charset="0"/>
+                </a:rPr>
+                <a:t>Diante da pandemia da COVID-19, as aulas online têm sido avaliadas e aplicadas em algumas instituições como substitutas temporárias do ensino presencial. Inúmeros professores que nunca tiveram experiência com um ensino nesta modalidade, de repente, se veem diante do desafio de ministrarem um curso remoto. Eis que surge a pergunta: "Como proporcionar ao aluno um ensino online de qualidade, criativo e dinâmico de forma a envolvê-lo ativamente nas aulas?". Para tentar responder à pergunta, irei apresentar algumas atividades e ferramentas que podem ser utilizadas no ensino online. A ideia principal é compartilharmos experiências e ideias a fim de nos prepararmos para uma nova forma de ensinar.</a:t>
               </a:r>
               <a:endParaRPr lang="pt-BR" sz="2800" b="1" dirty="0" smtClean="0">
                 <a:solidFill>

</xml_diff>

<commit_message>
atualizei a palestra do Bruno
</commit_message>
<xml_diff>
--- a/libs/uds/flyer.pptx
+++ b/libs/uds/flyer.pptx
@@ -5,7 +5,7 @@
     <p:sldMasterId id="2147483648" r:id="rId1"/>
   </p:sldMasterIdLst>
   <p:notesMasterIdLst>
-    <p:notesMasterId r:id="rId11"/>
+    <p:notesMasterId r:id="rId12"/>
   </p:notesMasterIdLst>
   <p:sldIdLst>
     <p:sldId id="256" r:id="rId2"/>
@@ -17,6 +17,7 @@
     <p:sldId id="261" r:id="rId8"/>
     <p:sldId id="263" r:id="rId9"/>
     <p:sldId id="264" r:id="rId10"/>
+    <p:sldId id="266" r:id="rId11"/>
   </p:sldIdLst>
   <p:sldSz cx="9144000" cy="6858000" type="screen4x3"/>
   <p:notesSz cx="6858000" cy="9144000"/>
@@ -201,7 +202,7 @@
             <a:fld id="{03CA6A64-D8DA-4790-AC21-8D1D39F048E7}" type="datetimeFigureOut">
               <a:rPr lang="pt-BR" smtClean="0"/>
               <a:pPr/>
-              <a:t>15/06/2020</a:t>
+              <a:t>26/06/2020</a:t>
             </a:fld>
             <a:endParaRPr lang="pt-BR"/>
           </a:p>
@@ -895,7 +896,7 @@
             <a:fld id="{32EE085F-AAA4-4482-A02A-EDCE077316B0}" type="datetimeFigureOut">
               <a:rPr lang="pt-BR" smtClean="0"/>
               <a:pPr/>
-              <a:t>15/06/2020</a:t>
+              <a:t>26/06/2020</a:t>
             </a:fld>
             <a:endParaRPr lang="pt-BR"/>
           </a:p>
@@ -1062,7 +1063,7 @@
             <a:fld id="{32EE085F-AAA4-4482-A02A-EDCE077316B0}" type="datetimeFigureOut">
               <a:rPr lang="pt-BR" smtClean="0"/>
               <a:pPr/>
-              <a:t>15/06/2020</a:t>
+              <a:t>26/06/2020</a:t>
             </a:fld>
             <a:endParaRPr lang="pt-BR"/>
           </a:p>
@@ -1239,7 +1240,7 @@
             <a:fld id="{32EE085F-AAA4-4482-A02A-EDCE077316B0}" type="datetimeFigureOut">
               <a:rPr lang="pt-BR" smtClean="0"/>
               <a:pPr/>
-              <a:t>15/06/2020</a:t>
+              <a:t>26/06/2020</a:t>
             </a:fld>
             <a:endParaRPr lang="pt-BR"/>
           </a:p>
@@ -1406,7 +1407,7 @@
             <a:fld id="{32EE085F-AAA4-4482-A02A-EDCE077316B0}" type="datetimeFigureOut">
               <a:rPr lang="pt-BR" smtClean="0"/>
               <a:pPr/>
-              <a:t>15/06/2020</a:t>
+              <a:t>26/06/2020</a:t>
             </a:fld>
             <a:endParaRPr lang="pt-BR"/>
           </a:p>
@@ -1649,7 +1650,7 @@
             <a:fld id="{32EE085F-AAA4-4482-A02A-EDCE077316B0}" type="datetimeFigureOut">
               <a:rPr lang="pt-BR" smtClean="0"/>
               <a:pPr/>
-              <a:t>15/06/2020</a:t>
+              <a:t>26/06/2020</a:t>
             </a:fld>
             <a:endParaRPr lang="pt-BR"/>
           </a:p>
@@ -1934,7 +1935,7 @@
             <a:fld id="{32EE085F-AAA4-4482-A02A-EDCE077316B0}" type="datetimeFigureOut">
               <a:rPr lang="pt-BR" smtClean="0"/>
               <a:pPr/>
-              <a:t>15/06/2020</a:t>
+              <a:t>26/06/2020</a:t>
             </a:fld>
             <a:endParaRPr lang="pt-BR"/>
           </a:p>
@@ -2353,7 +2354,7 @@
             <a:fld id="{32EE085F-AAA4-4482-A02A-EDCE077316B0}" type="datetimeFigureOut">
               <a:rPr lang="pt-BR" smtClean="0"/>
               <a:pPr/>
-              <a:t>15/06/2020</a:t>
+              <a:t>26/06/2020</a:t>
             </a:fld>
             <a:endParaRPr lang="pt-BR"/>
           </a:p>
@@ -2468,7 +2469,7 @@
             <a:fld id="{32EE085F-AAA4-4482-A02A-EDCE077316B0}" type="datetimeFigureOut">
               <a:rPr lang="pt-BR" smtClean="0"/>
               <a:pPr/>
-              <a:t>15/06/2020</a:t>
+              <a:t>26/06/2020</a:t>
             </a:fld>
             <a:endParaRPr lang="pt-BR"/>
           </a:p>
@@ -2560,7 +2561,7 @@
             <a:fld id="{32EE085F-AAA4-4482-A02A-EDCE077316B0}" type="datetimeFigureOut">
               <a:rPr lang="pt-BR" smtClean="0"/>
               <a:pPr/>
-              <a:t>15/06/2020</a:t>
+              <a:t>26/06/2020</a:t>
             </a:fld>
             <a:endParaRPr lang="pt-BR"/>
           </a:p>
@@ -2834,7 +2835,7 @@
             <a:fld id="{32EE085F-AAA4-4482-A02A-EDCE077316B0}" type="datetimeFigureOut">
               <a:rPr lang="pt-BR" smtClean="0"/>
               <a:pPr/>
-              <a:t>15/06/2020</a:t>
+              <a:t>26/06/2020</a:t>
             </a:fld>
             <a:endParaRPr lang="pt-BR"/>
           </a:p>
@@ -3084,7 +3085,7 @@
             <a:fld id="{32EE085F-AAA4-4482-A02A-EDCE077316B0}" type="datetimeFigureOut">
               <a:rPr lang="pt-BR" smtClean="0"/>
               <a:pPr/>
-              <a:t>15/06/2020</a:t>
+              <a:t>26/06/2020</a:t>
             </a:fld>
             <a:endParaRPr lang="pt-BR"/>
           </a:p>
@@ -3294,7 +3295,7 @@
             <a:fld id="{32EE085F-AAA4-4482-A02A-EDCE077316B0}" type="datetimeFigureOut">
               <a:rPr lang="pt-BR" smtClean="0"/>
               <a:pPr/>
-              <a:t>15/06/2020</a:t>
+              <a:t>26/06/2020</a:t>
             </a:fld>
             <a:endParaRPr lang="pt-BR"/>
           </a:p>
@@ -3706,6 +3707,594 @@
 </p:sld>
 </file>
 
+<file path=ppt/slides/slide10.xml><?xml version="1.0" encoding="utf-8"?>
+<p:sld xmlns:a="http://schemas.openxmlformats.org/drawingml/2006/main" xmlns:r="http://schemas.openxmlformats.org/officeDocument/2006/relationships" xmlns:p="http://schemas.openxmlformats.org/presentationml/2006/main">
+  <p:cSld>
+    <p:spTree>
+      <p:nvGrpSpPr>
+        <p:cNvPr id="1" name=""/>
+        <p:cNvGrpSpPr/>
+        <p:nvPr/>
+      </p:nvGrpSpPr>
+      <p:grpSpPr>
+        <a:xfrm>
+          <a:off x="0" y="0"/>
+          <a:ext cx="0" cy="0"/>
+          <a:chOff x="0" y="0"/>
+          <a:chExt cx="0" cy="0"/>
+        </a:xfrm>
+      </p:grpSpPr>
+      <p:grpSp>
+        <p:nvGrpSpPr>
+          <p:cNvPr id="9" name="Grupo 12"/>
+          <p:cNvGrpSpPr/>
+          <p:nvPr/>
+        </p:nvGrpSpPr>
+        <p:grpSpPr>
+          <a:xfrm>
+            <a:off x="0" y="27384"/>
+            <a:ext cx="9612560" cy="6858000"/>
+            <a:chOff x="-612576" y="-315416"/>
+            <a:chExt cx="9612560" cy="6858000"/>
+          </a:xfrm>
+        </p:grpSpPr>
+        <p:pic>
+          <p:nvPicPr>
+            <p:cNvPr id="15" name="Picture 4" descr="https://pbs.twimg.com/media/DfqjHpNU0AIuufg.jpg"/>
+            <p:cNvPicPr>
+              <a:picLocks noChangeAspect="1" noChangeArrowheads="1"/>
+            </p:cNvPicPr>
+            <p:nvPr/>
+          </p:nvPicPr>
+          <p:blipFill>
+            <a:blip r:embed="rId2" cstate="print">
+              <a:duotone>
+                <a:schemeClr val="accent5">
+                  <a:shade val="45000"/>
+                  <a:satMod val="135000"/>
+                </a:schemeClr>
+                <a:prstClr val="white"/>
+              </a:duotone>
+            </a:blip>
+            <a:srcRect b="9841"/>
+            <a:stretch>
+              <a:fillRect/>
+            </a:stretch>
+          </p:blipFill>
+          <p:spPr bwMode="auto">
+            <a:xfrm>
+              <a:off x="-612576" y="-315416"/>
+              <a:ext cx="9612560" cy="6858000"/>
+            </a:xfrm>
+            <a:prstGeom prst="rect">
+              <a:avLst/>
+            </a:prstGeom>
+            <a:noFill/>
+          </p:spPr>
+        </p:pic>
+        <p:pic>
+          <p:nvPicPr>
+            <p:cNvPr id="2" name="Imagem 1" descr="corpus-banner.png"/>
+            <p:cNvPicPr>
+              <a:picLocks noChangeAspect="1"/>
+            </p:cNvPicPr>
+            <p:nvPr/>
+          </p:nvPicPr>
+          <p:blipFill>
+            <a:blip r:embed="rId3" cstate="print"/>
+            <a:stretch>
+              <a:fillRect/>
+            </a:stretch>
+          </p:blipFill>
+          <p:spPr>
+            <a:xfrm>
+              <a:off x="-396552" y="1213992"/>
+              <a:ext cx="3672408" cy="4253755"/>
+            </a:xfrm>
+            <a:prstGeom prst="rect">
+              <a:avLst/>
+            </a:prstGeom>
+          </p:spPr>
+        </p:pic>
+        <p:sp>
+          <p:nvSpPr>
+            <p:cNvPr id="3" name="Retângulo 2"/>
+            <p:cNvSpPr/>
+            <p:nvPr/>
+          </p:nvSpPr>
+          <p:spPr>
+            <a:xfrm>
+              <a:off x="3347864" y="-226168"/>
+              <a:ext cx="5410198" cy="1152128"/>
+            </a:xfrm>
+            <a:prstGeom prst="rect">
+              <a:avLst/>
+            </a:prstGeom>
+            <a:solidFill>
+              <a:schemeClr val="bg1"/>
+            </a:solidFill>
+            <a:ln>
+              <a:noFill/>
+            </a:ln>
+          </p:spPr>
+          <p:style>
+            <a:lnRef idx="2">
+              <a:schemeClr val="accent1">
+                <a:shade val="50000"/>
+              </a:schemeClr>
+            </a:lnRef>
+            <a:fillRef idx="1">
+              <a:schemeClr val="accent1"/>
+            </a:fillRef>
+            <a:effectRef idx="0">
+              <a:schemeClr val="accent1"/>
+            </a:effectRef>
+            <a:fontRef idx="minor">
+              <a:schemeClr val="lt1"/>
+            </a:fontRef>
+          </p:style>
+          <p:txBody>
+            <a:bodyPr rtlCol="0" anchor="ctr"/>
+            <a:lstStyle/>
+            <a:p>
+              <a:pPr algn="ctr"/>
+              <a:endParaRPr lang="pt-BR" b="1" dirty="0">
+                <a:solidFill>
+                  <a:schemeClr val="tx1"/>
+                </a:solidFill>
+              </a:endParaRPr>
+            </a:p>
+          </p:txBody>
+        </p:sp>
+        <p:sp>
+          <p:nvSpPr>
+            <p:cNvPr id="4" name="Retângulo 3"/>
+            <p:cNvSpPr/>
+            <p:nvPr/>
+          </p:nvSpPr>
+          <p:spPr>
+            <a:xfrm>
+              <a:off x="3359896" y="4382344"/>
+              <a:ext cx="5398166" cy="679202"/>
+            </a:xfrm>
+            <a:prstGeom prst="rect">
+              <a:avLst/>
+            </a:prstGeom>
+            <a:solidFill>
+              <a:schemeClr val="bg1"/>
+            </a:solidFill>
+            <a:ln>
+              <a:noFill/>
+            </a:ln>
+          </p:spPr>
+          <p:style>
+            <a:lnRef idx="2">
+              <a:schemeClr val="accent1">
+                <a:shade val="50000"/>
+              </a:schemeClr>
+            </a:lnRef>
+            <a:fillRef idx="1">
+              <a:schemeClr val="accent1"/>
+            </a:fillRef>
+            <a:effectRef idx="0">
+              <a:schemeClr val="accent1"/>
+            </a:effectRef>
+            <a:fontRef idx="minor">
+              <a:schemeClr val="lt1"/>
+            </a:fontRef>
+          </p:style>
+          <p:txBody>
+            <a:bodyPr rtlCol="0" anchor="ctr"/>
+            <a:lstStyle/>
+            <a:p>
+              <a:pPr algn="ctr"/>
+              <a:r>
+                <a:rPr lang="pt-BR" sz="3200" b="1" dirty="0" smtClean="0">
+                  <a:solidFill>
+                    <a:schemeClr val="tx1"/>
+                  </a:solidFill>
+                  <a:latin typeface="Ink Free" pitchFamily="66" charset="0"/>
+                </a:rPr>
+                <a:t>29/06   </a:t>
+              </a:r>
+              <a:r>
+                <a:rPr lang="pt-BR" sz="3200" b="1" dirty="0" smtClean="0">
+                  <a:solidFill>
+                    <a:schemeClr val="tx1"/>
+                  </a:solidFill>
+                  <a:latin typeface="Ink Free" pitchFamily="66" charset="0"/>
+                </a:rPr>
+                <a:t>14 horas</a:t>
+              </a:r>
+              <a:endParaRPr lang="pt-BR" sz="3200" b="1" dirty="0">
+                <a:solidFill>
+                  <a:schemeClr val="tx1"/>
+                </a:solidFill>
+                <a:latin typeface="Ink Free" pitchFamily="66" charset="0"/>
+              </a:endParaRPr>
+            </a:p>
+          </p:txBody>
+        </p:sp>
+        <p:sp>
+          <p:nvSpPr>
+            <p:cNvPr id="5" name="CaixaDeTexto 4"/>
+            <p:cNvSpPr txBox="1"/>
+            <p:nvPr/>
+          </p:nvSpPr>
+          <p:spPr>
+            <a:xfrm>
+              <a:off x="3429470" y="-255785"/>
+              <a:ext cx="5076056" cy="1569660"/>
+            </a:xfrm>
+            <a:prstGeom prst="rect">
+              <a:avLst/>
+            </a:prstGeom>
+            <a:noFill/>
+            <a:ln>
+              <a:noFill/>
+            </a:ln>
+          </p:spPr>
+          <p:txBody>
+            <a:bodyPr wrap="square" rtlCol="0">
+              <a:spAutoFit/>
+            </a:bodyPr>
+            <a:lstStyle/>
+            <a:p>
+              <a:r>
+                <a:rPr lang="pt-BR" sz="2400" b="1" dirty="0" smtClean="0">
+                  <a:latin typeface="Ink Free" pitchFamily="66" charset="0"/>
+                </a:rPr>
+                <a:t>Projetos no ensino superior e pesquisas: ações e reflexões de um professor esperançoso</a:t>
+              </a:r>
+            </a:p>
+            <a:p>
+              <a:endParaRPr lang="pt-BR" sz="2400" b="1" dirty="0" smtClean="0">
+                <a:latin typeface="Ink Free" pitchFamily="66" charset="0"/>
+              </a:endParaRPr>
+            </a:p>
+          </p:txBody>
+        </p:sp>
+        <p:sp>
+          <p:nvSpPr>
+            <p:cNvPr id="6" name="CaixaDeTexto 5"/>
+            <p:cNvSpPr txBox="1"/>
+            <p:nvPr/>
+          </p:nvSpPr>
+          <p:spPr>
+            <a:xfrm>
+              <a:off x="4444224" y="565920"/>
+              <a:ext cx="4376576" cy="400110"/>
+            </a:xfrm>
+            <a:prstGeom prst="rect">
+              <a:avLst/>
+            </a:prstGeom>
+            <a:noFill/>
+            <a:ln>
+              <a:noFill/>
+            </a:ln>
+          </p:spPr>
+          <p:txBody>
+            <a:bodyPr wrap="square" rtlCol="0">
+              <a:spAutoFit/>
+            </a:bodyPr>
+            <a:lstStyle/>
+            <a:p>
+              <a:pPr algn="r"/>
+              <a:r>
+                <a:rPr lang="pt-BR" sz="2000" b="1" dirty="0" smtClean="0">
+                  <a:latin typeface="Ink Free" pitchFamily="66" charset="0"/>
+                </a:rPr>
+                <a:t>Prof.  Bruno Simões</a:t>
+              </a:r>
+            </a:p>
+          </p:txBody>
+        </p:sp>
+        <p:sp>
+          <p:nvSpPr>
+            <p:cNvPr id="7" name="Retângulo 6"/>
+            <p:cNvSpPr/>
+            <p:nvPr/>
+          </p:nvSpPr>
+          <p:spPr>
+            <a:xfrm>
+              <a:off x="3353526" y="5142136"/>
+              <a:ext cx="5404536" cy="464344"/>
+            </a:xfrm>
+            <a:prstGeom prst="rect">
+              <a:avLst/>
+            </a:prstGeom>
+            <a:solidFill>
+              <a:schemeClr val="bg1"/>
+            </a:solidFill>
+            <a:ln>
+              <a:noFill/>
+            </a:ln>
+          </p:spPr>
+          <p:style>
+            <a:lnRef idx="2">
+              <a:schemeClr val="accent1">
+                <a:shade val="50000"/>
+              </a:schemeClr>
+            </a:lnRef>
+            <a:fillRef idx="1">
+              <a:schemeClr val="accent1"/>
+            </a:fillRef>
+            <a:effectRef idx="0">
+              <a:schemeClr val="accent1"/>
+            </a:effectRef>
+            <a:fontRef idx="minor">
+              <a:schemeClr val="lt1"/>
+            </a:fontRef>
+          </p:style>
+          <p:txBody>
+            <a:bodyPr rtlCol="0" anchor="ctr"/>
+            <a:lstStyle/>
+            <a:p>
+              <a:pPr algn="ctr"/>
+              <a:r>
+                <a:rPr lang="pt-BR" b="1" dirty="0" smtClean="0">
+                  <a:solidFill>
+                    <a:schemeClr val="tx1"/>
+                  </a:solidFill>
+                  <a:latin typeface="Ink Free" pitchFamily="66" charset="0"/>
+                </a:rPr>
+                <a:t>mediação:  </a:t>
+              </a:r>
+              <a:r>
+                <a:rPr lang="pt-BR" b="1" dirty="0" err="1" smtClean="0">
+                  <a:solidFill>
+                    <a:schemeClr val="tx1"/>
+                  </a:solidFill>
+                  <a:latin typeface="Ink Free" pitchFamily="66" charset="0"/>
+                </a:rPr>
+                <a:t>Profa</a:t>
+              </a:r>
+              <a:r>
+                <a:rPr lang="pt-BR" b="1" dirty="0" smtClean="0">
+                  <a:solidFill>
+                    <a:schemeClr val="tx1"/>
+                  </a:solidFill>
+                  <a:latin typeface="Ink Free" pitchFamily="66" charset="0"/>
+                </a:rPr>
+                <a:t>.  Beatriz Cunha</a:t>
+              </a:r>
+              <a:endParaRPr lang="pt-BR" b="1" dirty="0" smtClean="0">
+                <a:solidFill>
+                  <a:schemeClr val="tx1"/>
+                </a:solidFill>
+                <a:latin typeface="Ink Free" pitchFamily="66" charset="0"/>
+              </a:endParaRPr>
+            </a:p>
+          </p:txBody>
+        </p:sp>
+        <p:sp>
+          <p:nvSpPr>
+            <p:cNvPr id="8" name="Retângulo 7"/>
+            <p:cNvSpPr/>
+            <p:nvPr/>
+          </p:nvSpPr>
+          <p:spPr>
+            <a:xfrm>
+              <a:off x="3352335" y="5720823"/>
+              <a:ext cx="5405727" cy="821761"/>
+            </a:xfrm>
+            <a:prstGeom prst="rect">
+              <a:avLst/>
+            </a:prstGeom>
+            <a:solidFill>
+              <a:schemeClr val="bg1"/>
+            </a:solidFill>
+            <a:ln>
+              <a:noFill/>
+            </a:ln>
+          </p:spPr>
+          <p:style>
+            <a:lnRef idx="2">
+              <a:schemeClr val="accent1">
+                <a:shade val="50000"/>
+              </a:schemeClr>
+            </a:lnRef>
+            <a:fillRef idx="1">
+              <a:schemeClr val="accent1"/>
+            </a:fillRef>
+            <a:effectRef idx="0">
+              <a:schemeClr val="accent1"/>
+            </a:effectRef>
+            <a:fontRef idx="minor">
+              <a:schemeClr val="lt1"/>
+            </a:fontRef>
+          </p:style>
+          <p:txBody>
+            <a:bodyPr rtlCol="0" anchor="ctr"/>
+            <a:lstStyle/>
+            <a:p>
+              <a:pPr algn="ctr"/>
+              <a:r>
+                <a:rPr lang="pt-BR" sz="2400" dirty="0" smtClean="0">
+                  <a:solidFill>
+                    <a:schemeClr val="tx1"/>
+                  </a:solidFill>
+                  <a:latin typeface="Forte" pitchFamily="66" charset="0"/>
+                </a:rPr>
+                <a:t>Link </a:t>
+              </a:r>
+              <a:r>
+                <a:rPr lang="pt-BR" sz="2400" dirty="0">
+                  <a:solidFill>
+                    <a:schemeClr val="tx1"/>
+                  </a:solidFill>
+                  <a:latin typeface="Forte" pitchFamily="66" charset="0"/>
+                </a:rPr>
+                <a:t>para o </a:t>
+              </a:r>
+              <a:r>
+                <a:rPr lang="pt-BR" sz="2400" dirty="0" smtClean="0">
+                  <a:solidFill>
+                    <a:schemeClr val="tx1"/>
+                  </a:solidFill>
+                  <a:latin typeface="Forte" pitchFamily="66" charset="0"/>
+                </a:rPr>
+                <a:t>evento</a:t>
+              </a:r>
+            </a:p>
+            <a:p>
+              <a:pPr algn="ctr"/>
+              <a:r>
+                <a:rPr lang="pt-BR" sz="2400" b="1" dirty="0" err="1" smtClean="0">
+                  <a:hlinkClick r:id="rId4"/>
+                </a:rPr>
+                <a:t>meet</a:t>
+              </a:r>
+              <a:r>
+                <a:rPr lang="pt-BR" sz="2400" b="1" dirty="0" smtClean="0">
+                  <a:hlinkClick r:id="rId4"/>
+                </a:rPr>
+                <a:t>.google.com/</a:t>
+              </a:r>
+              <a:r>
+                <a:rPr lang="pt-BR" sz="2400" b="1" dirty="0" err="1" smtClean="0">
+                  <a:hlinkClick r:id="rId4"/>
+                </a:rPr>
+                <a:t>xjh-fimh-zxd</a:t>
+              </a:r>
+              <a:endParaRPr lang="pt-BR" sz="2400" b="1" dirty="0" smtClean="0">
+                <a:solidFill>
+                  <a:srgbClr val="002060"/>
+                </a:solidFill>
+              </a:endParaRPr>
+            </a:p>
+          </p:txBody>
+        </p:sp>
+        <p:sp>
+          <p:nvSpPr>
+            <p:cNvPr id="12" name="Retângulo 11"/>
+            <p:cNvSpPr/>
+            <p:nvPr/>
+          </p:nvSpPr>
+          <p:spPr>
+            <a:xfrm>
+              <a:off x="3357462" y="997968"/>
+              <a:ext cx="5400600" cy="3312368"/>
+            </a:xfrm>
+            <a:prstGeom prst="rect">
+              <a:avLst/>
+            </a:prstGeom>
+            <a:solidFill>
+              <a:schemeClr val="bg1"/>
+            </a:solidFill>
+            <a:ln>
+              <a:noFill/>
+            </a:ln>
+          </p:spPr>
+          <p:style>
+            <a:lnRef idx="2">
+              <a:schemeClr val="accent1">
+                <a:shade val="50000"/>
+              </a:schemeClr>
+            </a:lnRef>
+            <a:fillRef idx="1">
+              <a:schemeClr val="accent1"/>
+            </a:fillRef>
+            <a:effectRef idx="0">
+              <a:schemeClr val="accent1"/>
+            </a:effectRef>
+            <a:fontRef idx="minor">
+              <a:schemeClr val="lt1"/>
+            </a:fontRef>
+          </p:style>
+          <p:txBody>
+            <a:bodyPr rtlCol="0" anchor="ctr"/>
+            <a:lstStyle/>
+            <a:p>
+              <a:endParaRPr lang="pt-BR" sz="1600" b="1" dirty="0" smtClean="0">
+                <a:solidFill>
+                  <a:schemeClr val="tx1"/>
+                </a:solidFill>
+                <a:latin typeface="Ink Free" pitchFamily="66" charset="0"/>
+              </a:endParaRPr>
+            </a:p>
+            <a:p>
+              <a:r>
+                <a:rPr lang="pt-BR" sz="1600" b="1" dirty="0" smtClean="0">
+                  <a:solidFill>
+                    <a:schemeClr val="tx1"/>
+                  </a:solidFill>
+                  <a:latin typeface="Ink Free" pitchFamily="66" charset="0"/>
+                </a:rPr>
+                <a:t>A </a:t>
+              </a:r>
+              <a:r>
+                <a:rPr lang="pt-BR" sz="1600" b="1" dirty="0" smtClean="0">
+                  <a:solidFill>
+                    <a:schemeClr val="tx1"/>
+                  </a:solidFill>
+                  <a:latin typeface="Ink Free" pitchFamily="66" charset="0"/>
+                </a:rPr>
+                <a:t>pandemia de </a:t>
+              </a:r>
+              <a:r>
+                <a:rPr lang="pt-BR" sz="1600" b="1" dirty="0" err="1" smtClean="0">
+                  <a:solidFill>
+                    <a:schemeClr val="tx1"/>
+                  </a:solidFill>
+                  <a:latin typeface="Ink Free" pitchFamily="66" charset="0"/>
+                </a:rPr>
+                <a:t>Covid</a:t>
+              </a:r>
+              <a:r>
+                <a:rPr lang="pt-BR" sz="1600" b="1" dirty="0" smtClean="0">
+                  <a:solidFill>
+                    <a:schemeClr val="tx1"/>
+                  </a:solidFill>
+                  <a:latin typeface="Ink Free" pitchFamily="66" charset="0"/>
+                </a:rPr>
+                <a:t>-19 forçou inúmeros reflexões e transformações surgirem na nossa sociedade, que hoje se vê com maior responsabilidade com o próximo, a pensar em formas de reinventar a economia num processo mais participativo e no compartilhamento de saberes. Na Educação, professores debatem exaustivamente sobre novas abordagens metodológicas que possibilitem maior engajamento de alunos e professores na relação ensino-aprendizagem. </a:t>
+              </a:r>
+              <a:r>
+                <a:rPr lang="pt-BR" sz="1600" b="1" dirty="0" smtClean="0">
+                  <a:solidFill>
+                    <a:schemeClr val="tx1"/>
+                  </a:solidFill>
+                  <a:latin typeface="Ink Free" pitchFamily="66" charset="0"/>
+                </a:rPr>
+                <a:t>A ideia dessa apresentação é proporcionar um ambiente de discussões sobre a metodologia de projetos, debater sobre ideias já utilizadas para desenvolvê-los remotamente e mostrar algumas atividades que desenvolvo como professor e pesquisador durante este momento</a:t>
+              </a:r>
+              <a:r>
+                <a:rPr lang="pt-BR" sz="1600" b="1" dirty="0" smtClean="0">
+                  <a:solidFill>
+                    <a:schemeClr val="tx1"/>
+                  </a:solidFill>
+                  <a:latin typeface="Ink Free" pitchFamily="66" charset="0"/>
+                </a:rPr>
+                <a:t>.</a:t>
+              </a:r>
+            </a:p>
+            <a:p>
+              <a:endParaRPr lang="pt-BR" sz="1600" b="1" dirty="0" smtClean="0">
+                <a:solidFill>
+                  <a:schemeClr val="tx1"/>
+                </a:solidFill>
+                <a:latin typeface="Ink Free" pitchFamily="66" charset="0"/>
+              </a:endParaRPr>
+            </a:p>
+          </p:txBody>
+        </p:sp>
+      </p:grpSp>
+    </p:spTree>
+  </p:cSld>
+  <p:clrMapOvr>
+    <a:masterClrMapping/>
+  </p:clrMapOvr>
+  <p:timing>
+    <p:tnLst>
+      <p:par>
+        <p:cTn id="1" dur="indefinite" restart="never" nodeType="tmRoot"/>
+      </p:par>
+    </p:tnLst>
+  </p:timing>
+</p:sld>
+</file>
+
 <file path=ppt/slides/slide2.xml><?xml version="1.0" encoding="utf-8"?>
 <p:sld xmlns:a="http://schemas.openxmlformats.org/drawingml/2006/main" xmlns:r="http://schemas.openxmlformats.org/officeDocument/2006/relationships" xmlns:p="http://schemas.openxmlformats.org/presentationml/2006/main">
   <p:cSld>
@@ -7658,16 +8247,7 @@
                   </a:solidFill>
                   <a:latin typeface="Ink Free" pitchFamily="66" charset="0"/>
                 </a:rPr>
-                <a:t>22/06   </a:t>
-              </a:r>
-              <a:r>
-                <a:rPr lang="pt-BR" sz="3200" b="1" dirty="0" smtClean="0">
-                  <a:solidFill>
-                    <a:schemeClr val="tx1"/>
-                  </a:solidFill>
-                  <a:latin typeface="Ink Free" pitchFamily="66" charset="0"/>
-                </a:rPr>
-                <a:t>14 horas</a:t>
+                <a:t>22/06   14 horas</a:t>
               </a:r>
               <a:endParaRPr lang="pt-BR" sz="3200" b="1" dirty="0">
                 <a:solidFill>
@@ -7707,19 +8287,7 @@
                 <a:rPr lang="pt-BR" sz="2400" b="1" dirty="0" smtClean="0">
                   <a:latin typeface="Ink Free" pitchFamily="66" charset="0"/>
                 </a:rPr>
-                <a:t>Atividades </a:t>
-              </a:r>
-              <a:r>
-                <a:rPr lang="pt-BR" sz="2400" b="1" dirty="0" smtClean="0">
-                  <a:latin typeface="Ink Free" pitchFamily="66" charset="0"/>
-                </a:rPr>
-                <a:t>e Ferramentas para o Ensino </a:t>
-              </a:r>
-              <a:r>
-                <a:rPr lang="pt-BR" sz="2400" b="1" dirty="0" smtClean="0">
-                  <a:latin typeface="Ink Free" pitchFamily="66" charset="0"/>
-                </a:rPr>
-                <a:t>Online</a:t>
+                <a:t>Atividades e Ferramentas para o Ensino Online</a:t>
               </a:r>
             </a:p>
             <a:p>
@@ -7765,13 +8333,7 @@
                 <a:rPr lang="pt-BR" sz="2000" b="1" dirty="0" smtClean="0">
                   <a:latin typeface="Ink Free" pitchFamily="66" charset="0"/>
                 </a:rPr>
-                <a:t>. Letícia </a:t>
-              </a:r>
-              <a:r>
-                <a:rPr lang="pt-BR" sz="2000" b="1" dirty="0" smtClean="0">
-                  <a:latin typeface="Ink Free" pitchFamily="66" charset="0"/>
-                </a:rPr>
-                <a:t>Raposo</a:t>
+                <a:t>. Letícia Raposo</a:t>
               </a:r>
               <a:endParaRPr lang="pt-BR" b="1" dirty="0">
                 <a:latin typeface="Ink Free" pitchFamily="66" charset="0"/>
@@ -7828,41 +8390,8 @@
                   </a:solidFill>
                   <a:latin typeface="Ink Free" pitchFamily="66" charset="0"/>
                 </a:rPr>
-                <a:t>mediação:  Prof. </a:t>
-              </a:r>
-              <a:r>
-                <a:rPr lang="pt-BR" sz="2000" b="1" dirty="0" smtClean="0">
-                  <a:solidFill>
-                    <a:schemeClr val="tx1"/>
-                  </a:solidFill>
-                  <a:latin typeface="Ink Free" pitchFamily="66" charset="0"/>
-                </a:rPr>
-                <a:t> </a:t>
-              </a:r>
-              <a:r>
-                <a:rPr lang="pt-BR" sz="2000" b="1" dirty="0" smtClean="0">
-                  <a:solidFill>
-                    <a:schemeClr val="tx1"/>
-                  </a:solidFill>
-                  <a:latin typeface="Ink Free" pitchFamily="66" charset="0"/>
-                </a:rPr>
-                <a:t>Bruno </a:t>
-              </a:r>
-              <a:r>
-                <a:rPr lang="pt-BR" sz="2000" b="1" dirty="0" smtClean="0">
-                  <a:solidFill>
-                    <a:schemeClr val="tx1"/>
-                  </a:solidFill>
-                  <a:latin typeface="Ink Free" pitchFamily="66" charset="0"/>
-                </a:rPr>
-                <a:t>Simões</a:t>
-              </a:r>
-              <a:endParaRPr lang="pt-BR" sz="2000" b="1" dirty="0" smtClean="0">
-                <a:solidFill>
-                  <a:schemeClr val="tx1"/>
-                </a:solidFill>
-                <a:latin typeface="Ink Free" pitchFamily="66" charset="0"/>
-              </a:endParaRPr>
+                <a:t>mediação:  Prof.  Bruno Simões</a:t>
+              </a:r>
             </a:p>
           </p:txBody>
         </p:sp>

</xml_diff>